<commit_message>
Database e PPT atualizado
</commit_message>
<xml_diff>
--- a/Documentação/prototipo-site-harmony.pptx
+++ b/Documentação/prototipo-site-harmony.pptx
@@ -8,6 +8,7 @@
     <p:sldId id="257" r:id="rId2"/>
     <p:sldId id="258" r:id="rId3"/>
     <p:sldId id="256" r:id="rId4"/>
+    <p:sldId id="259" r:id="rId5"/>
   </p:sldIdLst>
   <p:sldSz cx="12192000" cy="6858000"/>
   <p:notesSz cx="6858000" cy="9144000"/>
@@ -106,6 +107,11 @@
       </a:defRPr>
     </a:lvl9pPr>
   </p:defaultTextStyle>
+  <p:extLst>
+    <p:ext uri="{EFAFB233-063F-42B5-8137-9DF3F51BA10A}">
+      <p15:sldGuideLst xmlns:p15="http://schemas.microsoft.com/office/powerpoint/2012/main"/>
+    </p:ext>
+  </p:extLst>
 </p:presentation>
 </file>
 
@@ -240,7 +246,7 @@
           <a:p>
             <a:fld id="{209D3E42-B3F6-4316-A641-65718FE538E2}" type="datetimeFigureOut">
               <a:rPr lang="pt-BR" smtClean="0"/>
-              <a:t>27/08/2019</a:t>
+              <a:t>28/08/2019</a:t>
             </a:fld>
             <a:endParaRPr lang="pt-BR"/>
           </a:p>
@@ -410,7 +416,7 @@
           <a:p>
             <a:fld id="{209D3E42-B3F6-4316-A641-65718FE538E2}" type="datetimeFigureOut">
               <a:rPr lang="pt-BR" smtClean="0"/>
-              <a:t>27/08/2019</a:t>
+              <a:t>28/08/2019</a:t>
             </a:fld>
             <a:endParaRPr lang="pt-BR"/>
           </a:p>
@@ -590,7 +596,7 @@
           <a:p>
             <a:fld id="{209D3E42-B3F6-4316-A641-65718FE538E2}" type="datetimeFigureOut">
               <a:rPr lang="pt-BR" smtClean="0"/>
-              <a:t>27/08/2019</a:t>
+              <a:t>28/08/2019</a:t>
             </a:fld>
             <a:endParaRPr lang="pt-BR"/>
           </a:p>
@@ -760,7 +766,7 @@
           <a:p>
             <a:fld id="{209D3E42-B3F6-4316-A641-65718FE538E2}" type="datetimeFigureOut">
               <a:rPr lang="pt-BR" smtClean="0"/>
-              <a:t>27/08/2019</a:t>
+              <a:t>28/08/2019</a:t>
             </a:fld>
             <a:endParaRPr lang="pt-BR"/>
           </a:p>
@@ -1006,7 +1012,7 @@
           <a:p>
             <a:fld id="{209D3E42-B3F6-4316-A641-65718FE538E2}" type="datetimeFigureOut">
               <a:rPr lang="pt-BR" smtClean="0"/>
-              <a:t>27/08/2019</a:t>
+              <a:t>28/08/2019</a:t>
             </a:fld>
             <a:endParaRPr lang="pt-BR"/>
           </a:p>
@@ -1238,7 +1244,7 @@
           <a:p>
             <a:fld id="{209D3E42-B3F6-4316-A641-65718FE538E2}" type="datetimeFigureOut">
               <a:rPr lang="pt-BR" smtClean="0"/>
-              <a:t>27/08/2019</a:t>
+              <a:t>28/08/2019</a:t>
             </a:fld>
             <a:endParaRPr lang="pt-BR"/>
           </a:p>
@@ -1605,7 +1611,7 @@
           <a:p>
             <a:fld id="{209D3E42-B3F6-4316-A641-65718FE538E2}" type="datetimeFigureOut">
               <a:rPr lang="pt-BR" smtClean="0"/>
-              <a:t>27/08/2019</a:t>
+              <a:t>28/08/2019</a:t>
             </a:fld>
             <a:endParaRPr lang="pt-BR"/>
           </a:p>
@@ -1723,7 +1729,7 @@
           <a:p>
             <a:fld id="{209D3E42-B3F6-4316-A641-65718FE538E2}" type="datetimeFigureOut">
               <a:rPr lang="pt-BR" smtClean="0"/>
-              <a:t>27/08/2019</a:t>
+              <a:t>28/08/2019</a:t>
             </a:fld>
             <a:endParaRPr lang="pt-BR"/>
           </a:p>
@@ -1818,7 +1824,7 @@
           <a:p>
             <a:fld id="{209D3E42-B3F6-4316-A641-65718FE538E2}" type="datetimeFigureOut">
               <a:rPr lang="pt-BR" smtClean="0"/>
-              <a:t>27/08/2019</a:t>
+              <a:t>28/08/2019</a:t>
             </a:fld>
             <a:endParaRPr lang="pt-BR"/>
           </a:p>
@@ -2095,7 +2101,7 @@
           <a:p>
             <a:fld id="{209D3E42-B3F6-4316-A641-65718FE538E2}" type="datetimeFigureOut">
               <a:rPr lang="pt-BR" smtClean="0"/>
-              <a:t>27/08/2019</a:t>
+              <a:t>28/08/2019</a:t>
             </a:fld>
             <a:endParaRPr lang="pt-BR"/>
           </a:p>
@@ -2352,7 +2358,7 @@
           <a:p>
             <a:fld id="{209D3E42-B3F6-4316-A641-65718FE538E2}" type="datetimeFigureOut">
               <a:rPr lang="pt-BR" smtClean="0"/>
-              <a:t>27/08/2019</a:t>
+              <a:t>28/08/2019</a:t>
             </a:fld>
             <a:endParaRPr lang="pt-BR"/>
           </a:p>
@@ -2565,7 +2571,7 @@
           <a:p>
             <a:fld id="{209D3E42-B3F6-4316-A641-65718FE538E2}" type="datetimeFigureOut">
               <a:rPr lang="pt-BR" smtClean="0"/>
-              <a:t>27/08/2019</a:t>
+              <a:t>28/08/2019</a:t>
             </a:fld>
             <a:endParaRPr lang="pt-BR"/>
           </a:p>
@@ -3402,6 +3408,616 @@
 </p:sld>
 </file>
 
+<file path=ppt/slides/slide4.xml><?xml version="1.0" encoding="utf-8"?>
+<p:sld xmlns:a="http://schemas.openxmlformats.org/drawingml/2006/main" xmlns:r="http://schemas.openxmlformats.org/officeDocument/2006/relationships" xmlns:p="http://schemas.openxmlformats.org/presentationml/2006/main">
+  <p:cSld>
+    <p:bg>
+      <p:bgPr>
+        <a:solidFill>
+          <a:schemeClr val="tx1"/>
+        </a:solidFill>
+        <a:effectLst/>
+      </p:bgPr>
+    </p:bg>
+    <p:spTree>
+      <p:nvGrpSpPr>
+        <p:cNvPr id="1" name=""/>
+        <p:cNvGrpSpPr/>
+        <p:nvPr/>
+      </p:nvGrpSpPr>
+      <p:grpSpPr>
+        <a:xfrm>
+          <a:off x="0" y="0"/>
+          <a:ext cx="0" cy="0"/>
+          <a:chOff x="0" y="0"/>
+          <a:chExt cx="0" cy="0"/>
+        </a:xfrm>
+      </p:grpSpPr>
+      <p:pic>
+        <p:nvPicPr>
+          <p:cNvPr id="2" name="Imagem 1"/>
+          <p:cNvPicPr>
+            <a:picLocks noChangeAspect="1"/>
+          </p:cNvPicPr>
+          <p:nvPr/>
+        </p:nvPicPr>
+        <p:blipFill>
+          <a:blip r:embed="rId2" cstate="print">
+            <a:extLst>
+              <a:ext uri="{28A0092B-C50C-407E-A947-70E740481C1C}">
+                <a14:useLocalDpi xmlns:a14="http://schemas.microsoft.com/office/drawing/2010/main" val="0"/>
+              </a:ext>
+            </a:extLst>
+          </a:blip>
+          <a:stretch>
+            <a:fillRect/>
+          </a:stretch>
+        </p:blipFill>
+        <p:spPr>
+          <a:xfrm>
+            <a:off x="1643098" y="1231845"/>
+            <a:ext cx="897238" cy="897238"/>
+          </a:xfrm>
+          <a:prstGeom prst="rect">
+            <a:avLst/>
+          </a:prstGeom>
+        </p:spPr>
+      </p:pic>
+      <p:pic>
+        <p:nvPicPr>
+          <p:cNvPr id="4" name="Imagem 3"/>
+          <p:cNvPicPr>
+            <a:picLocks noChangeAspect="1"/>
+          </p:cNvPicPr>
+          <p:nvPr/>
+        </p:nvPicPr>
+        <p:blipFill>
+          <a:blip r:embed="rId3" cstate="print">
+            <a:extLst>
+              <a:ext uri="{28A0092B-C50C-407E-A947-70E740481C1C}">
+                <a14:useLocalDpi xmlns:a14="http://schemas.microsoft.com/office/drawing/2010/main" val="0"/>
+              </a:ext>
+            </a:extLst>
+          </a:blip>
+          <a:stretch>
+            <a:fillRect/>
+          </a:stretch>
+        </p:blipFill>
+        <p:spPr>
+          <a:xfrm>
+            <a:off x="1397426" y="3569362"/>
+            <a:ext cx="1388581" cy="1388581"/>
+          </a:xfrm>
+          <a:prstGeom prst="rect">
+            <a:avLst/>
+          </a:prstGeom>
+        </p:spPr>
+      </p:pic>
+      <p:pic>
+        <p:nvPicPr>
+          <p:cNvPr id="6" name="Imagem 5"/>
+          <p:cNvPicPr>
+            <a:picLocks noChangeAspect="1"/>
+          </p:cNvPicPr>
+          <p:nvPr/>
+        </p:nvPicPr>
+        <p:blipFill>
+          <a:blip r:embed="rId4" cstate="print">
+            <a:extLst>
+              <a:ext uri="{28A0092B-C50C-407E-A947-70E740481C1C}">
+                <a14:useLocalDpi xmlns:a14="http://schemas.microsoft.com/office/drawing/2010/main" val="0"/>
+              </a:ext>
+            </a:extLst>
+          </a:blip>
+          <a:stretch>
+            <a:fillRect/>
+          </a:stretch>
+        </p:blipFill>
+        <p:spPr>
+          <a:xfrm flipH="1">
+            <a:off x="5957721" y="1116077"/>
+            <a:ext cx="1169620" cy="1169620"/>
+          </a:xfrm>
+          <a:prstGeom prst="rect">
+            <a:avLst/>
+          </a:prstGeom>
+        </p:spPr>
+      </p:pic>
+      <p:pic>
+        <p:nvPicPr>
+          <p:cNvPr id="7" name="Imagem 6"/>
+          <p:cNvPicPr>
+            <a:picLocks noChangeAspect="1"/>
+          </p:cNvPicPr>
+          <p:nvPr/>
+        </p:nvPicPr>
+        <p:blipFill>
+          <a:blip r:embed="rId5" cstate="print">
+            <a:extLst>
+              <a:ext uri="{28A0092B-C50C-407E-A947-70E740481C1C}">
+                <a14:useLocalDpi xmlns:a14="http://schemas.microsoft.com/office/drawing/2010/main" val="0"/>
+              </a:ext>
+            </a:extLst>
+          </a:blip>
+          <a:stretch>
+            <a:fillRect/>
+          </a:stretch>
+        </p:blipFill>
+        <p:spPr>
+          <a:xfrm>
+            <a:off x="9673720" y="1291794"/>
+            <a:ext cx="1212465" cy="1212465"/>
+          </a:xfrm>
+          <a:prstGeom prst="rect">
+            <a:avLst/>
+          </a:prstGeom>
+        </p:spPr>
+      </p:pic>
+      <p:pic>
+        <p:nvPicPr>
+          <p:cNvPr id="8" name="Imagem 7"/>
+          <p:cNvPicPr>
+            <a:picLocks noChangeAspect="1"/>
+          </p:cNvPicPr>
+          <p:nvPr/>
+        </p:nvPicPr>
+        <p:blipFill>
+          <a:blip r:embed="rId6" cstate="print">
+            <a:extLst>
+              <a:ext uri="{28A0092B-C50C-407E-A947-70E740481C1C}">
+                <a14:useLocalDpi xmlns:a14="http://schemas.microsoft.com/office/drawing/2010/main" val="0"/>
+              </a:ext>
+            </a:extLst>
+          </a:blip>
+          <a:stretch>
+            <a:fillRect/>
+          </a:stretch>
+        </p:blipFill>
+        <p:spPr>
+          <a:xfrm>
+            <a:off x="9517356" y="3440724"/>
+            <a:ext cx="1525191" cy="1525191"/>
+          </a:xfrm>
+          <a:prstGeom prst="rect">
+            <a:avLst/>
+          </a:prstGeom>
+        </p:spPr>
+      </p:pic>
+      <p:cxnSp>
+        <p:nvCxnSpPr>
+          <p:cNvPr id="15" name="Conector de Seta Reta 14"/>
+          <p:cNvCxnSpPr/>
+          <p:nvPr/>
+        </p:nvCxnSpPr>
+        <p:spPr>
+          <a:xfrm flipH="1">
+            <a:off x="7661043" y="1554480"/>
+            <a:ext cx="1806835" cy="13314"/>
+          </a:xfrm>
+          <a:prstGeom prst="straightConnector1">
+            <a:avLst/>
+          </a:prstGeom>
+          <a:ln>
+            <a:tailEnd type="triangle"/>
+          </a:ln>
+        </p:spPr>
+        <p:style>
+          <a:lnRef idx="3">
+            <a:schemeClr val="dk1"/>
+          </a:lnRef>
+          <a:fillRef idx="0">
+            <a:schemeClr val="dk1"/>
+          </a:fillRef>
+          <a:effectRef idx="2">
+            <a:schemeClr val="dk1"/>
+          </a:effectRef>
+          <a:fontRef idx="minor">
+            <a:schemeClr val="tx1"/>
+          </a:fontRef>
+        </p:style>
+      </p:cxnSp>
+      <p:cxnSp>
+        <p:nvCxnSpPr>
+          <p:cNvPr id="17" name="Conector de Seta Reta 16"/>
+          <p:cNvCxnSpPr/>
+          <p:nvPr/>
+        </p:nvCxnSpPr>
+        <p:spPr>
+          <a:xfrm flipV="1">
+            <a:off x="7661043" y="1945079"/>
+            <a:ext cx="1806835" cy="53538"/>
+          </a:xfrm>
+          <a:prstGeom prst="straightConnector1">
+            <a:avLst/>
+          </a:prstGeom>
+          <a:ln>
+            <a:tailEnd type="triangle"/>
+          </a:ln>
+        </p:spPr>
+        <p:style>
+          <a:lnRef idx="3">
+            <a:schemeClr val="dk1"/>
+          </a:lnRef>
+          <a:fillRef idx="0">
+            <a:schemeClr val="dk1"/>
+          </a:fillRef>
+          <a:effectRef idx="2">
+            <a:schemeClr val="dk1"/>
+          </a:effectRef>
+          <a:fontRef idx="minor">
+            <a:schemeClr val="tx1"/>
+          </a:fontRef>
+        </p:style>
+      </p:cxnSp>
+      <p:cxnSp>
+        <p:nvCxnSpPr>
+          <p:cNvPr id="25" name="Conector de Seta Reta 24"/>
+          <p:cNvCxnSpPr/>
+          <p:nvPr/>
+        </p:nvCxnSpPr>
+        <p:spPr>
+          <a:xfrm flipH="1">
+            <a:off x="3369093" y="4522881"/>
+            <a:ext cx="2120174" cy="0"/>
+          </a:xfrm>
+          <a:prstGeom prst="straightConnector1">
+            <a:avLst/>
+          </a:prstGeom>
+          <a:ln>
+            <a:tailEnd type="triangle"/>
+          </a:ln>
+        </p:spPr>
+        <p:style>
+          <a:lnRef idx="3">
+            <a:schemeClr val="dk1"/>
+          </a:lnRef>
+          <a:fillRef idx="0">
+            <a:schemeClr val="dk1"/>
+          </a:fillRef>
+          <a:effectRef idx="2">
+            <a:schemeClr val="dk1"/>
+          </a:effectRef>
+          <a:fontRef idx="minor">
+            <a:schemeClr val="tx1"/>
+          </a:fontRef>
+        </p:style>
+      </p:cxnSp>
+      <p:cxnSp>
+        <p:nvCxnSpPr>
+          <p:cNvPr id="40" name="Conector de Seta Reta 39"/>
+          <p:cNvCxnSpPr/>
+          <p:nvPr/>
+        </p:nvCxnSpPr>
+        <p:spPr>
+          <a:xfrm>
+            <a:off x="3056708" y="1429251"/>
+            <a:ext cx="2445628" cy="0"/>
+          </a:xfrm>
+          <a:prstGeom prst="straightConnector1">
+            <a:avLst/>
+          </a:prstGeom>
+          <a:ln>
+            <a:tailEnd type="triangle"/>
+          </a:ln>
+        </p:spPr>
+        <p:style>
+          <a:lnRef idx="3">
+            <a:schemeClr val="dk1"/>
+          </a:lnRef>
+          <a:fillRef idx="0">
+            <a:schemeClr val="dk1"/>
+          </a:fillRef>
+          <a:effectRef idx="2">
+            <a:schemeClr val="dk1"/>
+          </a:effectRef>
+          <a:fontRef idx="minor">
+            <a:schemeClr val="tx1"/>
+          </a:fontRef>
+        </p:style>
+      </p:cxnSp>
+      <p:cxnSp>
+        <p:nvCxnSpPr>
+          <p:cNvPr id="42" name="Conector de Seta Reta 41"/>
+          <p:cNvCxnSpPr/>
+          <p:nvPr/>
+        </p:nvCxnSpPr>
+        <p:spPr>
+          <a:xfrm flipH="1">
+            <a:off x="3056708" y="1898027"/>
+            <a:ext cx="2445628" cy="0"/>
+          </a:xfrm>
+          <a:prstGeom prst="straightConnector1">
+            <a:avLst/>
+          </a:prstGeom>
+          <a:ln>
+            <a:tailEnd type="triangle"/>
+          </a:ln>
+        </p:spPr>
+        <p:style>
+          <a:lnRef idx="3">
+            <a:schemeClr val="dk1"/>
+          </a:lnRef>
+          <a:fillRef idx="0">
+            <a:schemeClr val="dk1"/>
+          </a:fillRef>
+          <a:effectRef idx="2">
+            <a:schemeClr val="dk1"/>
+          </a:effectRef>
+          <a:fontRef idx="minor">
+            <a:schemeClr val="tx1"/>
+          </a:fontRef>
+        </p:style>
+      </p:cxnSp>
+      <p:pic>
+        <p:nvPicPr>
+          <p:cNvPr id="43" name="Imagem 42"/>
+          <p:cNvPicPr>
+            <a:picLocks noChangeAspect="1"/>
+          </p:cNvPicPr>
+          <p:nvPr/>
+        </p:nvPicPr>
+        <p:blipFill>
+          <a:blip r:embed="rId7" cstate="print">
+            <a:extLst>
+              <a:ext uri="{28A0092B-C50C-407E-A947-70E740481C1C}">
+                <a14:useLocalDpi xmlns:a14="http://schemas.microsoft.com/office/drawing/2010/main" val="0"/>
+              </a:ext>
+            </a:extLst>
+          </a:blip>
+          <a:stretch>
+            <a:fillRect/>
+          </a:stretch>
+        </p:blipFill>
+        <p:spPr>
+          <a:xfrm>
+            <a:off x="5608152" y="3097158"/>
+            <a:ext cx="1868757" cy="1868757"/>
+          </a:xfrm>
+          <a:prstGeom prst="rect">
+            <a:avLst/>
+          </a:prstGeom>
+        </p:spPr>
+      </p:pic>
+      <p:sp>
+        <p:nvSpPr>
+          <p:cNvPr id="54" name="CaixaDeTexto 53"/>
+          <p:cNvSpPr txBox="1"/>
+          <p:nvPr/>
+        </p:nvSpPr>
+        <p:spPr>
+          <a:xfrm>
+            <a:off x="6040251" y="5217171"/>
+            <a:ext cx="1087090" cy="369332"/>
+          </a:xfrm>
+          <a:prstGeom prst="rect">
+            <a:avLst/>
+          </a:prstGeom>
+          <a:noFill/>
+        </p:spPr>
+        <p:txBody>
+          <a:bodyPr wrap="square" rtlCol="0">
+            <a:spAutoFit/>
+          </a:bodyPr>
+          <a:lstStyle/>
+          <a:p>
+            <a:r>
+              <a:rPr lang="pt-BR" dirty="0" smtClean="0"/>
+              <a:t>Usuário</a:t>
+            </a:r>
+            <a:endParaRPr lang="pt-BR" dirty="0"/>
+          </a:p>
+        </p:txBody>
+      </p:sp>
+      <p:cxnSp>
+        <p:nvCxnSpPr>
+          <p:cNvPr id="56" name="Conector de Seta Reta 55"/>
+          <p:cNvCxnSpPr/>
+          <p:nvPr/>
+        </p:nvCxnSpPr>
+        <p:spPr>
+          <a:xfrm flipV="1">
+            <a:off x="8059995" y="4522881"/>
+            <a:ext cx="1293011" cy="1"/>
+          </a:xfrm>
+          <a:prstGeom prst="straightConnector1">
+            <a:avLst/>
+          </a:prstGeom>
+          <a:ln>
+            <a:tailEnd type="triangle"/>
+          </a:ln>
+        </p:spPr>
+        <p:style>
+          <a:lnRef idx="3">
+            <a:schemeClr val="dk1"/>
+          </a:lnRef>
+          <a:fillRef idx="0">
+            <a:schemeClr val="dk1"/>
+          </a:fillRef>
+          <a:effectRef idx="2">
+            <a:schemeClr val="dk1"/>
+          </a:effectRef>
+          <a:fontRef idx="minor">
+            <a:schemeClr val="tx1"/>
+          </a:fontRef>
+        </p:style>
+      </p:cxnSp>
+      <p:sp>
+        <p:nvSpPr>
+          <p:cNvPr id="57" name="CaixaDeTexto 56"/>
+          <p:cNvSpPr txBox="1"/>
+          <p:nvPr/>
+        </p:nvSpPr>
+        <p:spPr>
+          <a:xfrm>
+            <a:off x="1257354" y="537224"/>
+            <a:ext cx="1668727" cy="369332"/>
+          </a:xfrm>
+          <a:prstGeom prst="rect">
+            <a:avLst/>
+          </a:prstGeom>
+          <a:noFill/>
+        </p:spPr>
+        <p:txBody>
+          <a:bodyPr wrap="none" rtlCol="0">
+            <a:spAutoFit/>
+          </a:bodyPr>
+          <a:lstStyle/>
+          <a:p>
+            <a:r>
+              <a:rPr lang="pt-BR" dirty="0" smtClean="0"/>
+              <a:t>Banco de dados</a:t>
+            </a:r>
+            <a:endParaRPr lang="pt-BR" dirty="0"/>
+          </a:p>
+        </p:txBody>
+      </p:sp>
+      <p:cxnSp>
+        <p:nvCxnSpPr>
+          <p:cNvPr id="59" name="Conector de Seta Reta 58"/>
+          <p:cNvCxnSpPr/>
+          <p:nvPr/>
+        </p:nvCxnSpPr>
+        <p:spPr>
+          <a:xfrm>
+            <a:off x="3567705" y="4031536"/>
+            <a:ext cx="1929437" cy="0"/>
+          </a:xfrm>
+          <a:prstGeom prst="straightConnector1">
+            <a:avLst/>
+          </a:prstGeom>
+          <a:ln>
+            <a:tailEnd type="triangle"/>
+          </a:ln>
+        </p:spPr>
+        <p:style>
+          <a:lnRef idx="3">
+            <a:schemeClr val="dk1"/>
+          </a:lnRef>
+          <a:fillRef idx="0">
+            <a:schemeClr val="dk1"/>
+          </a:fillRef>
+          <a:effectRef idx="2">
+            <a:schemeClr val="dk1"/>
+          </a:effectRef>
+          <a:fontRef idx="minor">
+            <a:schemeClr val="tx1"/>
+          </a:fontRef>
+        </p:style>
+      </p:cxnSp>
+      <p:cxnSp>
+        <p:nvCxnSpPr>
+          <p:cNvPr id="67" name="Conector de Seta Reta 66"/>
+          <p:cNvCxnSpPr/>
+          <p:nvPr/>
+        </p:nvCxnSpPr>
+        <p:spPr>
+          <a:xfrm flipH="1">
+            <a:off x="10149840" y="2504259"/>
+            <a:ext cx="13063" cy="1065103"/>
+          </a:xfrm>
+          <a:prstGeom prst="straightConnector1">
+            <a:avLst/>
+          </a:prstGeom>
+          <a:ln>
+            <a:tailEnd type="triangle"/>
+          </a:ln>
+        </p:spPr>
+        <p:style>
+          <a:lnRef idx="3">
+            <a:schemeClr val="dk1"/>
+          </a:lnRef>
+          <a:fillRef idx="0">
+            <a:schemeClr val="dk1"/>
+          </a:fillRef>
+          <a:effectRef idx="2">
+            <a:schemeClr val="dk1"/>
+          </a:effectRef>
+          <a:fontRef idx="minor">
+            <a:schemeClr val="tx1"/>
+          </a:fontRef>
+        </p:style>
+      </p:cxnSp>
+      <p:sp>
+        <p:nvSpPr>
+          <p:cNvPr id="68" name="CaixaDeTexto 67"/>
+          <p:cNvSpPr txBox="1"/>
+          <p:nvPr/>
+        </p:nvSpPr>
+        <p:spPr>
+          <a:xfrm>
+            <a:off x="1089903" y="5217171"/>
+            <a:ext cx="2003625" cy="369332"/>
+          </a:xfrm>
+          <a:prstGeom prst="rect">
+            <a:avLst/>
+          </a:prstGeom>
+          <a:noFill/>
+        </p:spPr>
+        <p:txBody>
+          <a:bodyPr wrap="none" rtlCol="0">
+            <a:spAutoFit/>
+          </a:bodyPr>
+          <a:lstStyle/>
+          <a:p>
+            <a:r>
+              <a:rPr lang="pt-BR" dirty="0" smtClean="0"/>
+              <a:t>Serviços em nuvem</a:t>
+            </a:r>
+            <a:endParaRPr lang="pt-BR" dirty="0"/>
+          </a:p>
+        </p:txBody>
+      </p:sp>
+      <p:sp>
+        <p:nvSpPr>
+          <p:cNvPr id="3" name="CaixaDeTexto 2"/>
+          <p:cNvSpPr txBox="1"/>
+          <p:nvPr/>
+        </p:nvSpPr>
+        <p:spPr>
+          <a:xfrm>
+            <a:off x="4922181" y="341015"/>
+            <a:ext cx="3164136" cy="523220"/>
+          </a:xfrm>
+          <a:prstGeom prst="rect">
+            <a:avLst/>
+          </a:prstGeom>
+          <a:noFill/>
+        </p:spPr>
+        <p:txBody>
+          <a:bodyPr wrap="none" rtlCol="0">
+            <a:spAutoFit/>
+          </a:bodyPr>
+          <a:lstStyle/>
+          <a:p>
+            <a:r>
+              <a:rPr lang="pt-BR" sz="2800" b="1" dirty="0" smtClean="0">
+                <a:solidFill>
+                  <a:schemeClr val="bg1"/>
+                </a:solidFill>
+              </a:rPr>
+              <a:t>Desenho de solução</a:t>
+            </a:r>
+            <a:endParaRPr lang="pt-BR" sz="2800" b="1" dirty="0">
+              <a:solidFill>
+                <a:schemeClr val="bg1"/>
+              </a:solidFill>
+            </a:endParaRPr>
+          </a:p>
+        </p:txBody>
+      </p:sp>
+    </p:spTree>
+    <p:extLst>
+      <p:ext uri="{BB962C8B-B14F-4D97-AF65-F5344CB8AC3E}">
+        <p14:creationId xmlns:p14="http://schemas.microsoft.com/office/powerpoint/2010/main" val="3981834426"/>
+      </p:ext>
+    </p:extLst>
+  </p:cSld>
+  <p:clrMapOvr>
+    <a:masterClrMapping/>
+  </p:clrMapOvr>
+</p:sld>
+</file>
+
 <file path=ppt/theme/theme1.xml><?xml version="1.0" encoding="utf-8"?>
 <a:theme xmlns:a="http://schemas.openxmlformats.org/drawingml/2006/main" name="Office Theme">
   <a:themeElements>

</xml_diff>